<commit_message>
Updates based on presentation & questions
git-svn-id: http://gforge.hl7.org/svn/fhir/trunk@70 2f0db536-2c49-4257-a3fa-e771ed206c19
</commit_message>
<xml_diff>
--- a/presentations/2012-May WGM Tutorials/201205 WGM Building with FHIR.pptx
+++ b/presentations/2012-May WGM Tutorials/201205 WGM Building with FHIR.pptx
@@ -5,7 +5,7 @@
     <p:sldMasterId id="2147483744" r:id="rId2"/>
   </p:sldMasterIdLst>
   <p:notesMasterIdLst>
-    <p:notesMasterId r:id="rId43"/>
+    <p:notesMasterId r:id="rId46"/>
   </p:notesMasterIdLst>
   <p:sldIdLst>
     <p:sldId id="270" r:id="rId3"/>
@@ -48,6 +48,9 @@
     <p:sldId id="303" r:id="rId40"/>
     <p:sldId id="302" r:id="rId41"/>
     <p:sldId id="301" r:id="rId42"/>
+    <p:sldId id="326" r:id="rId43"/>
+    <p:sldId id="327" r:id="rId44"/>
+    <p:sldId id="328" r:id="rId45"/>
   </p:sldIdLst>
   <p:sldSz cx="9144000" cy="6858000" type="screen4x3"/>
   <p:notesSz cx="6858000" cy="9144000"/>
@@ -8728,6 +8731,279 @@
 </p:sld>
 </file>
 
+<file path=ppt/slides/slide41.xml><?xml version="1.0" encoding="utf-8"?>
+<p:sld xmlns:a="http://schemas.openxmlformats.org/drawingml/2006/main" xmlns:r="http://schemas.openxmlformats.org/officeDocument/2006/relationships" xmlns:p="http://schemas.openxmlformats.org/presentationml/2006/main">
+  <p:cSld>
+    <p:spTree>
+      <p:nvGrpSpPr>
+        <p:cNvPr id="1" name=""/>
+        <p:cNvGrpSpPr/>
+        <p:nvPr/>
+      </p:nvGrpSpPr>
+      <p:grpSpPr>
+        <a:xfrm>
+          <a:off x="0" y="0"/>
+          <a:ext cx="0" cy="0"/>
+          <a:chOff x="0" y="0"/>
+          <a:chExt cx="0" cy="0"/>
+        </a:xfrm>
+      </p:grpSpPr>
+      <p:sp>
+        <p:nvSpPr>
+          <p:cNvPr id="5" name="Title 4"/>
+          <p:cNvSpPr>
+            <a:spLocks noGrp="1"/>
+          </p:cNvSpPr>
+          <p:nvPr>
+            <p:ph type="title"/>
+          </p:nvPr>
+        </p:nvSpPr>
+        <p:spPr/>
+        <p:txBody>
+          <a:bodyPr/>
+          <a:lstStyle/>
+          <a:p>
+            <a:r>
+              <a:rPr lang="en-US" dirty="0" smtClean="0"/>
+              <a:t>Questions &amp; Answers</a:t>
+            </a:r>
+            <a:endParaRPr lang="en-CA" dirty="0"/>
+          </a:p>
+        </p:txBody>
+      </p:sp>
+    </p:spTree>
+    <p:extLst>
+      <p:ext uri="{BB962C8B-B14F-4D97-AF65-F5344CB8AC3E}">
+        <p14:creationId xmlns:p14="http://schemas.microsoft.com/office/powerpoint/2010/main" val="79069440"/>
+      </p:ext>
+    </p:extLst>
+  </p:cSld>
+  <p:clrMapOvr>
+    <a:masterClrMapping/>
+  </p:clrMapOvr>
+  <p:timing>
+    <p:tnLst>
+      <p:par>
+        <p:cTn id="1" dur="indefinite" restart="never" nodeType="tmRoot"/>
+      </p:par>
+    </p:tnLst>
+  </p:timing>
+</p:sld>
+</file>
+
+<file path=ppt/slides/slide42.xml><?xml version="1.0" encoding="utf-8"?>
+<p:sld xmlns:a="http://schemas.openxmlformats.org/drawingml/2006/main" xmlns:r="http://schemas.openxmlformats.org/officeDocument/2006/relationships" xmlns:p="http://schemas.openxmlformats.org/presentationml/2006/main">
+  <p:cSld>
+    <p:spTree>
+      <p:nvGrpSpPr>
+        <p:cNvPr id="1" name=""/>
+        <p:cNvGrpSpPr/>
+        <p:nvPr/>
+      </p:nvGrpSpPr>
+      <p:grpSpPr>
+        <a:xfrm>
+          <a:off x="0" y="0"/>
+          <a:ext cx="0" cy="0"/>
+          <a:chOff x="0" y="0"/>
+          <a:chExt cx="0" cy="0"/>
+        </a:xfrm>
+      </p:grpSpPr>
+      <p:sp>
+        <p:nvSpPr>
+          <p:cNvPr id="2" name="Title 1"/>
+          <p:cNvSpPr>
+            <a:spLocks noGrp="1"/>
+          </p:cNvSpPr>
+          <p:nvPr>
+            <p:ph type="title"/>
+          </p:nvPr>
+        </p:nvSpPr>
+        <p:spPr/>
+        <p:txBody>
+          <a:bodyPr/>
+          <a:lstStyle/>
+          <a:p>
+            <a:r>
+              <a:rPr lang="en-US" dirty="0" smtClean="0"/>
+              <a:t>Q&amp;A</a:t>
+            </a:r>
+            <a:endParaRPr lang="en-CA" dirty="0"/>
+          </a:p>
+        </p:txBody>
+      </p:sp>
+      <p:sp>
+        <p:nvSpPr>
+          <p:cNvPr id="3" name="Text Placeholder 2"/>
+          <p:cNvSpPr>
+            <a:spLocks noGrp="1"/>
+          </p:cNvSpPr>
+          <p:nvPr>
+            <p:ph idx="1"/>
+          </p:nvPr>
+        </p:nvSpPr>
+        <p:spPr/>
+        <p:txBody>
+          <a:bodyPr/>
+          <a:lstStyle/>
+          <a:p>
+            <a:r>
+              <a:rPr lang="en-US" dirty="0" smtClean="0"/>
+              <a:t>The</a:t>
+            </a:r>
+            <a:r>
+              <a:rPr lang="en-US" baseline="0" dirty="0" smtClean="0"/>
+              <a:t> following slides were not part of the tutorial presentation, but summarize questions asked during or following the presentation.</a:t>
+            </a:r>
+          </a:p>
+          <a:p>
+            <a:pPr lvl="1"/>
+            <a:r>
+              <a:rPr lang="en-US" dirty="0" smtClean="0"/>
+              <a:t>Note: Some comments were applied directly as updates to slides</a:t>
+            </a:r>
+            <a:r>
+              <a:rPr lang="en-US" baseline="0" dirty="0" smtClean="0"/>
+              <a:t> rather than included in this section</a:t>
+            </a:r>
+            <a:endParaRPr lang="en-CA" dirty="0"/>
+          </a:p>
+        </p:txBody>
+      </p:sp>
+    </p:spTree>
+    <p:extLst>
+      <p:ext uri="{BB962C8B-B14F-4D97-AF65-F5344CB8AC3E}">
+        <p14:creationId xmlns:p14="http://schemas.microsoft.com/office/powerpoint/2010/main" val="4047790814"/>
+      </p:ext>
+    </p:extLst>
+  </p:cSld>
+  <p:clrMapOvr>
+    <a:masterClrMapping/>
+  </p:clrMapOvr>
+</p:sld>
+</file>
+
+<file path=ppt/slides/slide43.xml><?xml version="1.0" encoding="utf-8"?>
+<p:sld xmlns:a="http://schemas.openxmlformats.org/drawingml/2006/main" xmlns:r="http://schemas.openxmlformats.org/officeDocument/2006/relationships" xmlns:p="http://schemas.openxmlformats.org/presentationml/2006/main">
+  <p:cSld>
+    <p:spTree>
+      <p:nvGrpSpPr>
+        <p:cNvPr id="1" name=""/>
+        <p:cNvGrpSpPr/>
+        <p:nvPr/>
+      </p:nvGrpSpPr>
+      <p:grpSpPr>
+        <a:xfrm>
+          <a:off x="0" y="0"/>
+          <a:ext cx="0" cy="0"/>
+          <a:chOff x="0" y="0"/>
+          <a:chExt cx="0" cy="0"/>
+        </a:xfrm>
+      </p:grpSpPr>
+      <p:sp>
+        <p:nvSpPr>
+          <p:cNvPr id="2" name="Title 1"/>
+          <p:cNvSpPr>
+            <a:spLocks noGrp="1"/>
+          </p:cNvSpPr>
+          <p:nvPr>
+            <p:ph type="title"/>
+          </p:nvPr>
+        </p:nvSpPr>
+        <p:spPr/>
+        <p:txBody>
+          <a:bodyPr/>
+          <a:lstStyle/>
+          <a:p>
+            <a:r>
+              <a:rPr lang="en-US" dirty="0" smtClean="0"/>
+              <a:t>Q&amp;A</a:t>
+            </a:r>
+            <a:endParaRPr lang="en-CA" dirty="0"/>
+          </a:p>
+        </p:txBody>
+      </p:sp>
+      <p:sp>
+        <p:nvSpPr>
+          <p:cNvPr id="3" name="Content Placeholder 2"/>
+          <p:cNvSpPr>
+            <a:spLocks noGrp="1"/>
+          </p:cNvSpPr>
+          <p:nvPr>
+            <p:ph idx="1"/>
+          </p:nvPr>
+        </p:nvSpPr>
+        <p:spPr/>
+        <p:txBody>
+          <a:bodyPr>
+            <a:normAutofit fontScale="77500" lnSpcReduction="20000"/>
+          </a:bodyPr>
+          <a:lstStyle/>
+          <a:p>
+            <a:r>
+              <a:rPr lang="en-US" dirty="0" smtClean="0"/>
+              <a:t>Is a resource definition a resource?</a:t>
+            </a:r>
+          </a:p>
+          <a:p>
+            <a:pPr lvl="1"/>
+            <a:r>
+              <a:rPr lang="en-US" dirty="0" smtClean="0"/>
+              <a:t>It could be.  Will consider this</a:t>
+            </a:r>
+          </a:p>
+          <a:p>
+            <a:r>
+              <a:rPr lang="en-US" dirty="0" smtClean="0"/>
+              <a:t>Why do we require ‘id’, ‘extensions’ and ‘text’ columns in the definition.  Why not add them automatically during build?</a:t>
+            </a:r>
+          </a:p>
+          <a:p>
+            <a:pPr lvl="1"/>
+            <a:r>
+              <a:rPr lang="en-US" dirty="0" smtClean="0"/>
+              <a:t>Want to allow committees to provide contextual information if appropriate</a:t>
+            </a:r>
+          </a:p>
+          <a:p>
+            <a:r>
+              <a:rPr lang="en-US" dirty="0" smtClean="0"/>
+              <a:t>What does “Must Understand” mean?</a:t>
+            </a:r>
+          </a:p>
+          <a:p>
+            <a:pPr lvl="1"/>
+            <a:r>
+              <a:rPr lang="en-US" dirty="0" smtClean="0"/>
+              <a:t>Can’t ignore the element without full understanding of the element and how it impacts other semantics.</a:t>
+            </a:r>
+          </a:p>
+          <a:p>
+            <a:pPr lvl="1"/>
+            <a:r>
+              <a:rPr lang="en-US" dirty="0" smtClean="0"/>
+              <a:t>Will provide </a:t>
+            </a:r>
+            <a:r>
+              <a:rPr lang="en-US" smtClean="0"/>
+              <a:t>better description</a:t>
+            </a:r>
+            <a:endParaRPr lang="en-CA" dirty="0"/>
+          </a:p>
+        </p:txBody>
+      </p:sp>
+    </p:spTree>
+    <p:extLst>
+      <p:ext uri="{BB962C8B-B14F-4D97-AF65-F5344CB8AC3E}">
+        <p14:creationId xmlns:p14="http://schemas.microsoft.com/office/powerpoint/2010/main" val="318220665"/>
+      </p:ext>
+    </p:extLst>
+  </p:cSld>
+  <p:clrMapOvr>
+    <a:masterClrMapping/>
+  </p:clrMapOvr>
+</p:sld>
+</file>
+
 <file path=ppt/slides/slide5.xml><?xml version="1.0" encoding="utf-8"?>
 <p:sld xmlns:a="http://schemas.openxmlformats.org/drawingml/2006/main" xmlns:r="http://schemas.openxmlformats.org/officeDocument/2006/relationships" xmlns:p="http://schemas.openxmlformats.org/presentationml/2006/main">
   <p:cSld>
@@ -8841,11 +9117,7 @@
             <a:pPr lvl="0"/>
             <a:r>
               <a:rPr lang="en-US" dirty="0" smtClean="0"/>
-              <a:t>Essentially HL7 </a:t>
-            </a:r>
-            <a:r>
-              <a:rPr lang="en-US" dirty="0" smtClean="0"/>
-              <a:t>v4</a:t>
+              <a:t>Essentially HL7 v4</a:t>
             </a:r>
           </a:p>
           <a:p>
@@ -8854,7 +9126,6 @@
               <a:rPr lang="en-US" dirty="0" smtClean="0"/>
               <a:t>Pronounced “FIRE”</a:t>
             </a:r>
-            <a:endParaRPr lang="en-US" dirty="0" smtClean="0"/>
           </a:p>
           <a:p>
             <a:pPr lvl="0"/>

</xml_diff>